<commit_message>
Added python Functionality QA documwnt
</commit_message>
<xml_diff>
--- a/Web App Wire Frames.pptx
+++ b/Web App Wire Frames.pptx
@@ -106,6 +106,11 @@
       </a:defRPr>
     </a:lvl9pPr>
   </p:defaultTextStyle>
+  <p:extLst>
+    <p:ext uri="{EFAFB233-063F-42B5-8137-9DF3F51BA10A}">
+      <p15:sldGuideLst xmlns:p15="http://schemas.microsoft.com/office/powerpoint/2012/main"/>
+    </p:ext>
+  </p:extLst>
 </p:presentation>
 </file>
 
@@ -3720,8 +3725,8 @@
         </p:nvSpPr>
         <p:spPr>
           <a:xfrm>
-            <a:off x="3800228" y="4829103"/>
-            <a:ext cx="1070480" cy="215444"/>
+            <a:off x="3389241" y="4821854"/>
+            <a:ext cx="398322" cy="215444"/>
           </a:xfrm>
           <a:prstGeom prst="rect">
             <a:avLst/>
@@ -3817,8 +3822,8 @@
         </p:nvSpPr>
         <p:spPr>
           <a:xfrm>
-            <a:off x="3802462" y="5023744"/>
-            <a:ext cx="1070480" cy="215444"/>
+            <a:off x="3382235" y="5015353"/>
+            <a:ext cx="436251" cy="215444"/>
           </a:xfrm>
           <a:prstGeom prst="rect">
             <a:avLst/>
@@ -6072,6 +6077,88 @@
           <a:p>
             <a:pPr algn="ctr"/>
             <a:endParaRPr lang="en-GB"/>
+          </a:p>
+        </p:txBody>
+      </p:sp>
+      <p:sp>
+        <p:nvSpPr>
+          <p:cNvPr id="65" name="TextBox 64">
+            <a:extLst>
+              <a:ext uri="{FF2B5EF4-FFF2-40B4-BE49-F238E27FC236}">
+                <a16:creationId xmlns:a16="http://schemas.microsoft.com/office/drawing/2014/main" id="{7BBA7AF2-76D0-48F9-8E24-402CAB1DBCAB}"/>
+              </a:ext>
+            </a:extLst>
+          </p:cNvPr>
+          <p:cNvSpPr txBox="1"/>
+          <p:nvPr/>
+        </p:nvSpPr>
+        <p:spPr>
+          <a:xfrm>
+            <a:off x="3755505" y="4834713"/>
+            <a:ext cx="398322" cy="215444"/>
+          </a:xfrm>
+          <a:prstGeom prst="rect">
+            <a:avLst/>
+          </a:prstGeom>
+          <a:noFill/>
+        </p:spPr>
+        <p:txBody>
+          <a:bodyPr wrap="square" rtlCol="0">
+            <a:spAutoFit/>
+          </a:bodyPr>
+          <a:lstStyle/>
+          <a:p>
+            <a:r>
+              <a:rPr lang="en-GB" sz="800" dirty="0">
+                <a:solidFill>
+                  <a:schemeClr val="bg1">
+                    <a:lumMod val="50000"/>
+                  </a:schemeClr>
+                </a:solidFill>
+              </a:rPr>
+              <a:t>30g</a:t>
+            </a:r>
+          </a:p>
+        </p:txBody>
+      </p:sp>
+      <p:sp>
+        <p:nvSpPr>
+          <p:cNvPr id="66" name="TextBox 65">
+            <a:extLst>
+              <a:ext uri="{FF2B5EF4-FFF2-40B4-BE49-F238E27FC236}">
+                <a16:creationId xmlns:a16="http://schemas.microsoft.com/office/drawing/2014/main" id="{CACB6518-0318-404E-A8B5-BE7DE0952828}"/>
+              </a:ext>
+            </a:extLst>
+          </p:cNvPr>
+          <p:cNvSpPr txBox="1"/>
+          <p:nvPr/>
+        </p:nvSpPr>
+        <p:spPr>
+          <a:xfrm>
+            <a:off x="3751159" y="5011314"/>
+            <a:ext cx="398322" cy="215444"/>
+          </a:xfrm>
+          <a:prstGeom prst="rect">
+            <a:avLst/>
+          </a:prstGeom>
+          <a:noFill/>
+        </p:spPr>
+        <p:txBody>
+          <a:bodyPr wrap="square" rtlCol="0">
+            <a:spAutoFit/>
+          </a:bodyPr>
+          <a:lstStyle/>
+          <a:p>
+            <a:r>
+              <a:rPr lang="en-GB" sz="800" dirty="0">
+                <a:solidFill>
+                  <a:schemeClr val="bg1">
+                    <a:lumMod val="50000"/>
+                  </a:schemeClr>
+                </a:solidFill>
+              </a:rPr>
+              <a:t>60g</a:t>
+            </a:r>
           </a:p>
         </p:txBody>
       </p:sp>
@@ -6342,8 +6429,8 @@
         </p:nvSpPr>
         <p:spPr>
           <a:xfrm>
-            <a:off x="3720207" y="1183482"/>
-            <a:ext cx="1070480" cy="215444"/>
+            <a:off x="3183032" y="1192343"/>
+            <a:ext cx="416469" cy="215444"/>
           </a:xfrm>
           <a:prstGeom prst="rect">
             <a:avLst/>
@@ -6439,8 +6526,8 @@
         </p:nvSpPr>
         <p:spPr>
           <a:xfrm>
-            <a:off x="3722441" y="1378123"/>
-            <a:ext cx="1070480" cy="215444"/>
+            <a:off x="3174554" y="1368922"/>
+            <a:ext cx="414235" cy="215444"/>
           </a:xfrm>
           <a:prstGeom prst="rect">
             <a:avLst/>
@@ -8323,6 +8410,88 @@
             <a:r>
               <a:rPr lang="en-GB" sz="1500" dirty="0"/>
               <a:t>Sweet and Sour Pork</a:t>
+            </a:r>
+          </a:p>
+        </p:txBody>
+      </p:sp>
+      <p:sp>
+        <p:nvSpPr>
+          <p:cNvPr id="60" name="TextBox 59">
+            <a:extLst>
+              <a:ext uri="{FF2B5EF4-FFF2-40B4-BE49-F238E27FC236}">
+                <a16:creationId xmlns:a16="http://schemas.microsoft.com/office/drawing/2014/main" id="{09DFE9CC-BAF1-479D-82FA-D2498326E9EB}"/>
+              </a:ext>
+            </a:extLst>
+          </p:cNvPr>
+          <p:cNvSpPr txBox="1"/>
+          <p:nvPr/>
+        </p:nvSpPr>
+        <p:spPr>
+          <a:xfrm>
+            <a:off x="3592020" y="1195992"/>
+            <a:ext cx="398322" cy="215444"/>
+          </a:xfrm>
+          <a:prstGeom prst="rect">
+            <a:avLst/>
+          </a:prstGeom>
+          <a:noFill/>
+        </p:spPr>
+        <p:txBody>
+          <a:bodyPr wrap="square" rtlCol="0">
+            <a:spAutoFit/>
+          </a:bodyPr>
+          <a:lstStyle/>
+          <a:p>
+            <a:r>
+              <a:rPr lang="en-GB" sz="800" dirty="0">
+                <a:solidFill>
+                  <a:schemeClr val="bg1">
+                    <a:lumMod val="50000"/>
+                  </a:schemeClr>
+                </a:solidFill>
+              </a:rPr>
+              <a:t>60g</a:t>
+            </a:r>
+          </a:p>
+        </p:txBody>
+      </p:sp>
+      <p:sp>
+        <p:nvSpPr>
+          <p:cNvPr id="61" name="TextBox 60">
+            <a:extLst>
+              <a:ext uri="{FF2B5EF4-FFF2-40B4-BE49-F238E27FC236}">
+                <a16:creationId xmlns:a16="http://schemas.microsoft.com/office/drawing/2014/main" id="{CE77BF45-7217-488A-99D2-6EF106536241}"/>
+              </a:ext>
+            </a:extLst>
+          </p:cNvPr>
+          <p:cNvSpPr txBox="1"/>
+          <p:nvPr/>
+        </p:nvSpPr>
+        <p:spPr>
+          <a:xfrm>
+            <a:off x="3580444" y="1378164"/>
+            <a:ext cx="398322" cy="215444"/>
+          </a:xfrm>
+          <a:prstGeom prst="rect">
+            <a:avLst/>
+          </a:prstGeom>
+          <a:noFill/>
+        </p:spPr>
+        <p:txBody>
+          <a:bodyPr wrap="square" rtlCol="0">
+            <a:spAutoFit/>
+          </a:bodyPr>
+          <a:lstStyle/>
+          <a:p>
+            <a:r>
+              <a:rPr lang="en-GB" sz="800" dirty="0">
+                <a:solidFill>
+                  <a:schemeClr val="bg1">
+                    <a:lumMod val="50000"/>
+                  </a:schemeClr>
+                </a:solidFill>
+              </a:rPr>
+              <a:t>30g</a:t>
             </a:r>
           </a:p>
         </p:txBody>

</xml_diff>